<commit_message>
not feeling super smart
</commit_message>
<xml_diff>
--- a/scaffold/Reports/breakdown_figs_files/figure-gfm/Presentation2.pptx
+++ b/scaffold/Reports/breakdown_figs_files/figure-gfm/Presentation2.pptx
@@ -5,7 +5,7 @@
     <p:sldMasterId id="2147483648" r:id="rId1"/>
   </p:sldMasterIdLst>
   <p:notesMasterIdLst>
-    <p:notesMasterId r:id="rId10"/>
+    <p:notesMasterId r:id="rId12"/>
   </p:notesMasterIdLst>
   <p:sldIdLst>
     <p:sldId id="256" r:id="rId2"/>
@@ -13,9 +13,11 @@
     <p:sldId id="258" r:id="rId4"/>
     <p:sldId id="260" r:id="rId5"/>
     <p:sldId id="261" r:id="rId6"/>
-    <p:sldId id="262" r:id="rId7"/>
-    <p:sldId id="263" r:id="rId8"/>
-    <p:sldId id="264" r:id="rId9"/>
+    <p:sldId id="266" r:id="rId7"/>
+    <p:sldId id="262" r:id="rId8"/>
+    <p:sldId id="263" r:id="rId9"/>
+    <p:sldId id="264" r:id="rId10"/>
+    <p:sldId id="265" r:id="rId11"/>
   </p:sldIdLst>
   <p:sldSz cx="12192000" cy="6858000"/>
   <p:notesSz cx="6858000" cy="9144000"/>
@@ -114,6 +116,14 @@
       </a:defRPr>
     </a:lvl9pPr>
   </p:defaultTextStyle>
+  <p:extLst>
+    <p:ext uri="{EFAFB233-063F-42B5-8137-9DF3F51BA10A}">
+      <p15:sldGuideLst xmlns:p15="http://schemas.microsoft.com/office/powerpoint/2012/main"/>
+    </p:ext>
+    <p:ext uri="{2D200454-40CA-4A62-9FC3-DE9A4176ACB9}">
+      <p15:notesGuideLst xmlns:p15="http://schemas.microsoft.com/office/powerpoint/2012/main"/>
+    </p:ext>
+  </p:extLst>
 </p:presentation>
 </file>
 
@@ -4484,6 +4494,113 @@
 </p:sld>
 </file>
 
+<file path=ppt/slides/slide10.xml><?xml version="1.0" encoding="utf-8"?>
+<p:sld xmlns:a="http://schemas.openxmlformats.org/drawingml/2006/main" xmlns:r="http://schemas.openxmlformats.org/officeDocument/2006/relationships" xmlns:p="http://schemas.openxmlformats.org/presentationml/2006/main">
+  <p:cSld>
+    <p:spTree>
+      <p:nvGrpSpPr>
+        <p:cNvPr id="1" name=""/>
+        <p:cNvGrpSpPr/>
+        <p:nvPr/>
+      </p:nvGrpSpPr>
+      <p:grpSpPr>
+        <a:xfrm>
+          <a:off x="0" y="0"/>
+          <a:ext cx="0" cy="0"/>
+          <a:chOff x="0" y="0"/>
+          <a:chExt cx="0" cy="0"/>
+        </a:xfrm>
+      </p:grpSpPr>
+      <p:sp>
+        <p:nvSpPr>
+          <p:cNvPr id="2" name="Title 1">
+            <a:extLst>
+              <a:ext uri="{FF2B5EF4-FFF2-40B4-BE49-F238E27FC236}">
+                <a16:creationId xmlns:a16="http://schemas.microsoft.com/office/drawing/2014/main" id="{52DD2488-D6EE-224D-B5FB-CFC9B4FD426F}"/>
+              </a:ext>
+            </a:extLst>
+          </p:cNvPr>
+          <p:cNvSpPr>
+            <a:spLocks noGrp="1"/>
+          </p:cNvSpPr>
+          <p:nvPr>
+            <p:ph type="title"/>
+          </p:nvPr>
+        </p:nvSpPr>
+        <p:spPr/>
+        <p:txBody>
+          <a:bodyPr/>
+          <a:lstStyle/>
+          <a:p>
+            <a:endParaRPr lang="en-US"/>
+          </a:p>
+        </p:txBody>
+      </p:sp>
+      <p:sp>
+        <p:nvSpPr>
+          <p:cNvPr id="3" name="Content Placeholder 2">
+            <a:extLst>
+              <a:ext uri="{FF2B5EF4-FFF2-40B4-BE49-F238E27FC236}">
+                <a16:creationId xmlns:a16="http://schemas.microsoft.com/office/drawing/2014/main" id="{11F5D33D-3B08-154F-8F1B-C257EEE3B01C}"/>
+              </a:ext>
+            </a:extLst>
+          </p:cNvPr>
+          <p:cNvSpPr>
+            <a:spLocks noGrp="1"/>
+          </p:cNvSpPr>
+          <p:nvPr>
+            <p:ph idx="1"/>
+          </p:nvPr>
+        </p:nvSpPr>
+        <p:spPr/>
+        <p:txBody>
+          <a:bodyPr/>
+          <a:lstStyle/>
+          <a:p>
+            <a:r>
+              <a:rPr lang="en-US" dirty="0"/>
+              <a:t>Even an assemblage of very similar species, which have at one point been shown to overlap sufficient for compensation, are now sufficiently partitioned/structured that there isn’t a detectable compensatory effect.</a:t>
+            </a:r>
+          </a:p>
+          <a:p>
+            <a:r>
+              <a:rPr lang="en-US" dirty="0"/>
+              <a:t>Compensation isn’t a fixed property of an assemblage…context matters</a:t>
+            </a:r>
+          </a:p>
+          <a:p>
+            <a:r>
+              <a:rPr lang="en-US" dirty="0"/>
+              <a:t>Shifts in the compensatory effect may play out at larger spatial and temporal scales. If these shifts are happening driven by things like (rare) colonization events, broad shifts in habitat or climate… they may come and go at long time scales</a:t>
+            </a:r>
+          </a:p>
+          <a:p>
+            <a:r>
+              <a:rPr lang="en-US" dirty="0"/>
+              <a:t>And if they come and go at long time scales, it means the importance of the zero-sum/resource constraint is intermittent at short time scales</a:t>
+            </a:r>
+          </a:p>
+          <a:p>
+            <a:r>
+              <a:rPr lang="en-US" dirty="0"/>
+              <a:t>In one sense maybe E isn’t more stable than the species assemblage; in another, maybe it’s more stable in the short term? Maybe “little things” – I’m not sure what I mean by those – don’t </a:t>
+            </a:r>
+          </a:p>
+        </p:txBody>
+      </p:sp>
+    </p:spTree>
+    <p:extLst>
+      <p:ext uri="{BB962C8B-B14F-4D97-AF65-F5344CB8AC3E}">
+        <p14:creationId xmlns:p14="http://schemas.microsoft.com/office/powerpoint/2010/main" val="3707003059"/>
+      </p:ext>
+    </p:extLst>
+  </p:cSld>
+  <p:clrMapOvr>
+    <a:masterClrMapping/>
+  </p:clrMapOvr>
+</p:sld>
+</file>
+
 <file path=ppt/slides/slide2.xml><?xml version="1.0" encoding="utf-8"?>
 <p:sld xmlns:a="http://schemas.openxmlformats.org/drawingml/2006/main" xmlns:r="http://schemas.openxmlformats.org/officeDocument/2006/relationships" xmlns:p="http://schemas.openxmlformats.org/presentationml/2006/main">
   <p:cSld>
@@ -4979,7 +5096,7 @@
           <p:cNvPr id="2" name="Title 1">
             <a:extLst>
               <a:ext uri="{FF2B5EF4-FFF2-40B4-BE49-F238E27FC236}">
-                <a16:creationId xmlns:a16="http://schemas.microsoft.com/office/drawing/2014/main" id="{FD089A24-6B7B-3D4E-80BC-BC9A455DD9B1}"/>
+                <a16:creationId xmlns:a16="http://schemas.microsoft.com/office/drawing/2014/main" id="{DA9CED9A-8B5C-4D48-8605-D247C97EF7E5}"/>
               </a:ext>
             </a:extLst>
           </p:cNvPr>
@@ -4995,7 +5112,7 @@
           <a:bodyPr/>
           <a:lstStyle/>
           <a:p>
-            <a:endParaRPr lang="en-US" dirty="0"/>
+            <a:endParaRPr lang="en-US"/>
           </a:p>
         </p:txBody>
       </p:sp>
@@ -5004,7 +5121,7 @@
           <p:cNvPr id="3" name="Content Placeholder 2">
             <a:extLst>
               <a:ext uri="{FF2B5EF4-FFF2-40B4-BE49-F238E27FC236}">
-                <a16:creationId xmlns:a16="http://schemas.microsoft.com/office/drawing/2014/main" id="{85CBC676-6A1C-3942-8109-846C661D99CF}"/>
+                <a16:creationId xmlns:a16="http://schemas.microsoft.com/office/drawing/2014/main" id="{A24897AD-2A6D-F340-B91C-70CB172B3616}"/>
               </a:ext>
             </a:extLst>
           </p:cNvPr>
@@ -5017,100 +5134,27 @@
         </p:nvSpPr>
         <p:spPr/>
         <p:txBody>
-          <a:bodyPr>
-            <a:normAutofit/>
-          </a:bodyPr>
+          <a:bodyPr/>
           <a:lstStyle/>
           <a:p>
             <a:r>
               <a:rPr lang="en-US" dirty="0"/>
-              <a:t>The earlier compensation effect – the partial one – also appears to have faded out.</a:t>
+              <a:t>Also interesting that the closest </a:t>
+            </a:r>
+            <a:r>
+              <a:rPr lang="en-US" dirty="0" err="1"/>
+              <a:t>krat</a:t>
+            </a:r>
+            <a:r>
+              <a:rPr lang="en-US" dirty="0"/>
+              <a:t> analog is also looking to have the shortest tenure as a major player in the system</a:t>
             </a:r>
           </a:p>
           <a:p>
             <a:pPr lvl="1"/>
             <a:r>
               <a:rPr lang="en-US" dirty="0"/>
-              <a:t>It may be that PB’s continued presence in the system suppresses the smaller ones, but PB abundances are </a:t>
-            </a:r>
-            <a:r>
-              <a:rPr lang="en-US" i="1" dirty="0"/>
-              <a:t>greatly reduced </a:t>
-            </a:r>
-            <a:r>
-              <a:rPr lang="en-US" dirty="0"/>
-              <a:t>now. </a:t>
-            </a:r>
-          </a:p>
-          <a:p>
-            <a:r>
-              <a:rPr lang="en-US" dirty="0"/>
-              <a:t>Removing </a:t>
-            </a:r>
-            <a:r>
-              <a:rPr lang="en-US" dirty="0" err="1"/>
-              <a:t>krats</a:t>
-            </a:r>
-            <a:r>
-              <a:rPr lang="en-US" dirty="0"/>
-              <a:t> now results in a </a:t>
-            </a:r>
-            <a:r>
-              <a:rPr lang="en-US" i="1" dirty="0"/>
-              <a:t>smaller </a:t>
-            </a:r>
-            <a:r>
-              <a:rPr lang="en-US" dirty="0"/>
-              <a:t>shortfall, but </a:t>
-            </a:r>
-            <a:r>
-              <a:rPr lang="en-US" i="1" dirty="0"/>
-              <a:t>none of it </a:t>
-            </a:r>
-            <a:r>
-              <a:rPr lang="en-US" dirty="0"/>
-              <a:t>is made up by compensatory gains from small granivores.</a:t>
-            </a:r>
-          </a:p>
-          <a:p>
-            <a:r>
-              <a:rPr lang="en-US" dirty="0"/>
-              <a:t>Suggests a shift in the extent to which they’re overlapping in the resources they use or can access. At present, small granivores are not expanding their horizons even with kangaroo rats gone.</a:t>
-            </a:r>
-          </a:p>
-          <a:p>
-            <a:pPr lvl="1"/>
-            <a:r>
-              <a:rPr lang="en-US" dirty="0"/>
-              <a:t>Note also that small granivores are a lot more abundant in general now than they were in the early days.</a:t>
-            </a:r>
-          </a:p>
-          <a:p>
-            <a:r>
-              <a:rPr lang="en-US" dirty="0"/>
-              <a:t>To the extent that the rodents were engaged in a fluid zero-sum dynamic in the 1970s, that seems to be being replaced by a much more structured situation. </a:t>
-            </a:r>
-          </a:p>
-          <a:p>
-            <a:r>
-              <a:rPr lang="en-US" dirty="0"/>
-              <a:t>Kangaroo rats now have a </a:t>
-            </a:r>
-            <a:r>
-              <a:rPr lang="en-US" i="1" dirty="0"/>
-              <a:t>smaller </a:t>
-            </a:r>
-            <a:r>
-              <a:rPr lang="en-US" dirty="0"/>
-              <a:t>but </a:t>
-            </a:r>
-            <a:r>
-              <a:rPr lang="en-US" i="1" dirty="0"/>
-              <a:t>less substitutable </a:t>
-            </a:r>
-            <a:r>
-              <a:rPr lang="en-US" dirty="0"/>
-              <a:t>slice of the pie.</a:t>
+              <a:t>Whatever shifts are happening, PB is doing the worst job weathering them</a:t>
             </a:r>
           </a:p>
         </p:txBody>
@@ -5118,7 +5162,7 @@
     </p:spTree>
     <p:extLst>
       <p:ext uri="{BB962C8B-B14F-4D97-AF65-F5344CB8AC3E}">
-        <p14:creationId xmlns:p14="http://schemas.microsoft.com/office/powerpoint/2010/main" val="1559407628"/>
+        <p14:creationId xmlns:p14="http://schemas.microsoft.com/office/powerpoint/2010/main" val="3563442074"/>
       </p:ext>
     </p:extLst>
   </p:cSld>
@@ -5150,6 +5194,177 @@
           <p:cNvPr id="2" name="Title 1">
             <a:extLst>
               <a:ext uri="{FF2B5EF4-FFF2-40B4-BE49-F238E27FC236}">
+                <a16:creationId xmlns:a16="http://schemas.microsoft.com/office/drawing/2014/main" id="{FD089A24-6B7B-3D4E-80BC-BC9A455DD9B1}"/>
+              </a:ext>
+            </a:extLst>
+          </p:cNvPr>
+          <p:cNvSpPr>
+            <a:spLocks noGrp="1"/>
+          </p:cNvSpPr>
+          <p:nvPr>
+            <p:ph type="title"/>
+          </p:nvPr>
+        </p:nvSpPr>
+        <p:spPr/>
+        <p:txBody>
+          <a:bodyPr/>
+          <a:lstStyle/>
+          <a:p>
+            <a:endParaRPr lang="en-US" dirty="0"/>
+          </a:p>
+        </p:txBody>
+      </p:sp>
+      <p:sp>
+        <p:nvSpPr>
+          <p:cNvPr id="3" name="Content Placeholder 2">
+            <a:extLst>
+              <a:ext uri="{FF2B5EF4-FFF2-40B4-BE49-F238E27FC236}">
+                <a16:creationId xmlns:a16="http://schemas.microsoft.com/office/drawing/2014/main" id="{85CBC676-6A1C-3942-8109-846C661D99CF}"/>
+              </a:ext>
+            </a:extLst>
+          </p:cNvPr>
+          <p:cNvSpPr>
+            <a:spLocks noGrp="1"/>
+          </p:cNvSpPr>
+          <p:nvPr>
+            <p:ph idx="1"/>
+          </p:nvPr>
+        </p:nvSpPr>
+        <p:spPr/>
+        <p:txBody>
+          <a:bodyPr>
+            <a:normAutofit/>
+          </a:bodyPr>
+          <a:lstStyle/>
+          <a:p>
+            <a:r>
+              <a:rPr lang="en-US" dirty="0"/>
+              <a:t>The earlier compensation effect – the partial one – also appears to have faded out.</a:t>
+            </a:r>
+          </a:p>
+          <a:p>
+            <a:pPr lvl="1"/>
+            <a:r>
+              <a:rPr lang="en-US" dirty="0"/>
+              <a:t>It may be that PB’s continued presence in the system suppresses the smaller ones, but PB abundances are </a:t>
+            </a:r>
+            <a:r>
+              <a:rPr lang="en-US" i="1" dirty="0"/>
+              <a:t>greatly reduced </a:t>
+            </a:r>
+            <a:r>
+              <a:rPr lang="en-US" dirty="0"/>
+              <a:t>now. </a:t>
+            </a:r>
+          </a:p>
+          <a:p>
+            <a:r>
+              <a:rPr lang="en-US" dirty="0"/>
+              <a:t>Removing </a:t>
+            </a:r>
+            <a:r>
+              <a:rPr lang="en-US" dirty="0" err="1"/>
+              <a:t>krats</a:t>
+            </a:r>
+            <a:r>
+              <a:rPr lang="en-US" dirty="0"/>
+              <a:t> now results in a </a:t>
+            </a:r>
+            <a:r>
+              <a:rPr lang="en-US" i="1" dirty="0"/>
+              <a:t>smaller </a:t>
+            </a:r>
+            <a:r>
+              <a:rPr lang="en-US" dirty="0"/>
+              <a:t>shortfall, but </a:t>
+            </a:r>
+            <a:r>
+              <a:rPr lang="en-US" i="1" dirty="0"/>
+              <a:t>none of it </a:t>
+            </a:r>
+            <a:r>
+              <a:rPr lang="en-US" dirty="0"/>
+              <a:t>is made up by compensatory gains from small granivores.</a:t>
+            </a:r>
+          </a:p>
+          <a:p>
+            <a:r>
+              <a:rPr lang="en-US" dirty="0"/>
+              <a:t>Suggests a shift in the extent to which they’re overlapping in the resources they use or can access. At present, small granivores are not expanding their horizons even with kangaroo rats gone.</a:t>
+            </a:r>
+          </a:p>
+          <a:p>
+            <a:pPr lvl="1"/>
+            <a:r>
+              <a:rPr lang="en-US" dirty="0"/>
+              <a:t>Note also that small granivores are a lot more abundant in general now than they were in the early days.</a:t>
+            </a:r>
+          </a:p>
+          <a:p>
+            <a:r>
+              <a:rPr lang="en-US" dirty="0"/>
+              <a:t>To the extent that the rodents were engaged in a fluid zero-sum dynamic in the 1970s, that seems to be being replaced by a much more structured situation. </a:t>
+            </a:r>
+          </a:p>
+          <a:p>
+            <a:r>
+              <a:rPr lang="en-US" dirty="0"/>
+              <a:t>Kangaroo rats now have a </a:t>
+            </a:r>
+            <a:r>
+              <a:rPr lang="en-US" i="1" dirty="0"/>
+              <a:t>smaller </a:t>
+            </a:r>
+            <a:r>
+              <a:rPr lang="en-US" dirty="0"/>
+              <a:t>but </a:t>
+            </a:r>
+            <a:r>
+              <a:rPr lang="en-US" i="1" dirty="0"/>
+              <a:t>less substitutable </a:t>
+            </a:r>
+            <a:r>
+              <a:rPr lang="en-US" dirty="0"/>
+              <a:t>slice of the pie.</a:t>
+            </a:r>
+          </a:p>
+        </p:txBody>
+      </p:sp>
+    </p:spTree>
+    <p:extLst>
+      <p:ext uri="{BB962C8B-B14F-4D97-AF65-F5344CB8AC3E}">
+        <p14:creationId xmlns:p14="http://schemas.microsoft.com/office/powerpoint/2010/main" val="1559407628"/>
+      </p:ext>
+    </p:extLst>
+  </p:cSld>
+  <p:clrMapOvr>
+    <a:masterClrMapping/>
+  </p:clrMapOvr>
+</p:sld>
+</file>
+
+<file path=ppt/slides/slide8.xml><?xml version="1.0" encoding="utf-8"?>
+<p:sld xmlns:a="http://schemas.openxmlformats.org/drawingml/2006/main" xmlns:r="http://schemas.openxmlformats.org/officeDocument/2006/relationships" xmlns:p="http://schemas.openxmlformats.org/presentationml/2006/main">
+  <p:cSld>
+    <p:spTree>
+      <p:nvGrpSpPr>
+        <p:cNvPr id="1" name=""/>
+        <p:cNvGrpSpPr/>
+        <p:nvPr/>
+      </p:nvGrpSpPr>
+      <p:grpSpPr>
+        <a:xfrm>
+          <a:off x="0" y="0"/>
+          <a:ext cx="0" cy="0"/>
+          <a:chOff x="0" y="0"/>
+          <a:chExt cx="0" cy="0"/>
+        </a:xfrm>
+      </p:grpSpPr>
+      <p:sp>
+        <p:nvSpPr>
+          <p:cNvPr id="2" name="Title 1">
+            <a:extLst>
+              <a:ext uri="{FF2B5EF4-FFF2-40B4-BE49-F238E27FC236}">
                 <a16:creationId xmlns:a16="http://schemas.microsoft.com/office/drawing/2014/main" id="{4F1C8E7C-AAE5-514C-9D8C-FB852F7C86DF}"/>
               </a:ext>
             </a:extLst>
@@ -5247,8 +5462,40 @@
             </a:r>
           </a:p>
           <a:p>
-            <a:pPr lvl="1"/>
-            <a:endParaRPr lang="en-US" dirty="0"/>
+            <a:r>
+              <a:rPr lang="en-US" dirty="0"/>
+              <a:t>e.g. maybe now things are shrubby, so small granivores are using shrub resources and </a:t>
+            </a:r>
+            <a:r>
+              <a:rPr lang="en-US" dirty="0" err="1"/>
+              <a:t>krats</a:t>
+            </a:r>
+            <a:r>
+              <a:rPr lang="en-US" dirty="0"/>
+              <a:t> are foraging in the open. The little ones aren’t going out in the open anyway, so removing the </a:t>
+            </a:r>
+            <a:r>
+              <a:rPr lang="en-US" dirty="0" err="1"/>
+              <a:t>krats</a:t>
+            </a:r>
+            <a:r>
+              <a:rPr lang="en-US" dirty="0"/>
+              <a:t> has no effect on them.</a:t>
+            </a:r>
+          </a:p>
+          <a:p>
+            <a:r>
+              <a:rPr lang="en-US" dirty="0"/>
+              <a:t>Or maybe there’s an upper limit on how many </a:t>
+            </a:r>
+            <a:r>
+              <a:rPr lang="en-US" dirty="0" err="1"/>
+              <a:t>pps</a:t>
+            </a:r>
+            <a:r>
+              <a:rPr lang="en-US" dirty="0"/>
+              <a:t> that doesn’t have to do with resources.</a:t>
+            </a:r>
           </a:p>
         </p:txBody>
       </p:sp>
@@ -5265,7 +5512,7 @@
 </p:sld>
 </file>
 
-<file path=ppt/slides/slide8.xml><?xml version="1.0" encoding="utf-8"?>
+<file path=ppt/slides/slide9.xml><?xml version="1.0" encoding="utf-8"?>
 <p:sld xmlns:a="http://schemas.openxmlformats.org/drawingml/2006/main" xmlns:r="http://schemas.openxmlformats.org/officeDocument/2006/relationships" xmlns:p="http://schemas.openxmlformats.org/presentationml/2006/main">
   <p:cSld>
     <p:spTree>

</xml_diff>